<commit_message>
length comp exploratory analysis
</commit_message>
<xml_diff>
--- a/Data_inputs_overview.pptx
+++ b/Data_inputs_overview.pptx
@@ -10,7 +10,12 @@
     <p:sldId id="258" r:id="rId4"/>
     <p:sldId id="259" r:id="rId5"/>
     <p:sldId id="260" r:id="rId6"/>
-    <p:sldId id="261" r:id="rId7"/>
+    <p:sldId id="262" r:id="rId7"/>
+    <p:sldId id="263" r:id="rId8"/>
+    <p:sldId id="267" r:id="rId9"/>
+    <p:sldId id="261" r:id="rId10"/>
+    <p:sldId id="265" r:id="rId11"/>
+    <p:sldId id="266" r:id="rId12"/>
   </p:sldIdLst>
   <p:sldSz cx="12192000" cy="6858000"/>
   <p:notesSz cx="6858000" cy="9144000"/>
@@ -109,6 +114,11 @@
       </a:defRPr>
     </a:lvl9pPr>
   </p:defaultTextStyle>
+  <p:extLst>
+    <p:ext uri="{EFAFB233-063F-42B5-8137-9DF3F51BA10A}">
+      <p15:sldGuideLst xmlns:p15="http://schemas.microsoft.com/office/powerpoint/2012/main"/>
+    </p:ext>
+  </p:extLst>
 </p:presentation>
 </file>
 
@@ -243,7 +253,7 @@
           <a:p>
             <a:fld id="{75FFF20B-C669-49C9-A833-CC84E9CE09A2}" type="datetimeFigureOut">
               <a:rPr lang="en-US" smtClean="0"/>
-              <a:t>4/6/2021</a:t>
+              <a:t>4/7/2021</a:t>
             </a:fld>
             <a:endParaRPr lang="en-US"/>
           </a:p>
@@ -413,7 +423,7 @@
           <a:p>
             <a:fld id="{75FFF20B-C669-49C9-A833-CC84E9CE09A2}" type="datetimeFigureOut">
               <a:rPr lang="en-US" smtClean="0"/>
-              <a:t>4/6/2021</a:t>
+              <a:t>4/7/2021</a:t>
             </a:fld>
             <a:endParaRPr lang="en-US"/>
           </a:p>
@@ -593,7 +603,7 @@
           <a:p>
             <a:fld id="{75FFF20B-C669-49C9-A833-CC84E9CE09A2}" type="datetimeFigureOut">
               <a:rPr lang="en-US" smtClean="0"/>
-              <a:t>4/6/2021</a:t>
+              <a:t>4/7/2021</a:t>
             </a:fld>
             <a:endParaRPr lang="en-US"/>
           </a:p>
@@ -763,7 +773,7 @@
           <a:p>
             <a:fld id="{75FFF20B-C669-49C9-A833-CC84E9CE09A2}" type="datetimeFigureOut">
               <a:rPr lang="en-US" smtClean="0"/>
-              <a:t>4/6/2021</a:t>
+              <a:t>4/7/2021</a:t>
             </a:fld>
             <a:endParaRPr lang="en-US"/>
           </a:p>
@@ -1009,7 +1019,7 @@
           <a:p>
             <a:fld id="{75FFF20B-C669-49C9-A833-CC84E9CE09A2}" type="datetimeFigureOut">
               <a:rPr lang="en-US" smtClean="0"/>
-              <a:t>4/6/2021</a:t>
+              <a:t>4/7/2021</a:t>
             </a:fld>
             <a:endParaRPr lang="en-US"/>
           </a:p>
@@ -1241,7 +1251,7 @@
           <a:p>
             <a:fld id="{75FFF20B-C669-49C9-A833-CC84E9CE09A2}" type="datetimeFigureOut">
               <a:rPr lang="en-US" smtClean="0"/>
-              <a:t>4/6/2021</a:t>
+              <a:t>4/7/2021</a:t>
             </a:fld>
             <a:endParaRPr lang="en-US"/>
           </a:p>
@@ -1608,7 +1618,7 @@
           <a:p>
             <a:fld id="{75FFF20B-C669-49C9-A833-CC84E9CE09A2}" type="datetimeFigureOut">
               <a:rPr lang="en-US" smtClean="0"/>
-              <a:t>4/6/2021</a:t>
+              <a:t>4/7/2021</a:t>
             </a:fld>
             <a:endParaRPr lang="en-US"/>
           </a:p>
@@ -1726,7 +1736,7 @@
           <a:p>
             <a:fld id="{75FFF20B-C669-49C9-A833-CC84E9CE09A2}" type="datetimeFigureOut">
               <a:rPr lang="en-US" smtClean="0"/>
-              <a:t>4/6/2021</a:t>
+              <a:t>4/7/2021</a:t>
             </a:fld>
             <a:endParaRPr lang="en-US"/>
           </a:p>
@@ -1821,7 +1831,7 @@
           <a:p>
             <a:fld id="{75FFF20B-C669-49C9-A833-CC84E9CE09A2}" type="datetimeFigureOut">
               <a:rPr lang="en-US" smtClean="0"/>
-              <a:t>4/6/2021</a:t>
+              <a:t>4/7/2021</a:t>
             </a:fld>
             <a:endParaRPr lang="en-US"/>
           </a:p>
@@ -2098,7 +2108,7 @@
           <a:p>
             <a:fld id="{75FFF20B-C669-49C9-A833-CC84E9CE09A2}" type="datetimeFigureOut">
               <a:rPr lang="en-US" smtClean="0"/>
-              <a:t>4/6/2021</a:t>
+              <a:t>4/7/2021</a:t>
             </a:fld>
             <a:endParaRPr lang="en-US"/>
           </a:p>
@@ -2351,7 +2361,7 @@
           <a:p>
             <a:fld id="{75FFF20B-C669-49C9-A833-CC84E9CE09A2}" type="datetimeFigureOut">
               <a:rPr lang="en-US" smtClean="0"/>
-              <a:t>4/6/2021</a:t>
+              <a:t>4/7/2021</a:t>
             </a:fld>
             <a:endParaRPr lang="en-US"/>
           </a:p>
@@ -2564,7 +2574,7 @@
           <a:p>
             <a:fld id="{75FFF20B-C669-49C9-A833-CC84E9CE09A2}" type="datetimeFigureOut">
               <a:rPr lang="en-US" smtClean="0"/>
-              <a:t>4/6/2021</a:t>
+              <a:t>4/7/2021</a:t>
             </a:fld>
             <a:endParaRPr lang="en-US"/>
           </a:p>
@@ -2984,26 +2994,15 @@
           <a:bodyPr/>
           <a:lstStyle/>
           <a:p>
-            <a:endParaRPr lang="en-US"/>
-          </a:p>
-        </p:txBody>
-      </p:sp>
-      <p:sp>
-        <p:nvSpPr>
-          <p:cNvPr id="3" name="Subtitle 2"/>
-          <p:cNvSpPr>
-            <a:spLocks noGrp="1"/>
-          </p:cNvSpPr>
-          <p:nvPr>
-            <p:ph type="subTitle" idx="1"/>
-          </p:nvPr>
-        </p:nvSpPr>
-        <p:spPr/>
-        <p:txBody>
-          <a:bodyPr/>
-          <a:lstStyle/>
-          <a:p>
-            <a:endParaRPr lang="en-US"/>
+            <a:r>
+              <a:rPr lang="en-US" dirty="0" err="1" smtClean="0"/>
+              <a:t>Opakapaka</a:t>
+            </a:r>
+            <a:r>
+              <a:rPr lang="en-US" dirty="0" smtClean="0"/>
+              <a:t> SS Model Data Inputs</a:t>
+            </a:r>
+            <a:endParaRPr lang="en-US" dirty="0"/>
           </a:p>
         </p:txBody>
       </p:sp>
@@ -3011,6 +3010,285 @@
     <p:extLst>
       <p:ext uri="{BB962C8B-B14F-4D97-AF65-F5344CB8AC3E}">
         <p14:creationId xmlns:p14="http://schemas.microsoft.com/office/powerpoint/2010/main" val="2151691711"/>
+      </p:ext>
+    </p:extLst>
+  </p:cSld>
+  <p:clrMapOvr>
+    <a:masterClrMapping/>
+  </p:clrMapOvr>
+</p:sld>
+</file>
+
+<file path=ppt/slides/slide10.xml><?xml version="1.0" encoding="utf-8"?>
+<p:sld xmlns:a="http://schemas.openxmlformats.org/drawingml/2006/main" xmlns:r="http://schemas.openxmlformats.org/officeDocument/2006/relationships" xmlns:p="http://schemas.openxmlformats.org/presentationml/2006/main">
+  <p:cSld>
+    <p:spTree>
+      <p:nvGrpSpPr>
+        <p:cNvPr id="1" name=""/>
+        <p:cNvGrpSpPr/>
+        <p:nvPr/>
+      </p:nvGrpSpPr>
+      <p:grpSpPr>
+        <a:xfrm>
+          <a:off x="0" y="0"/>
+          <a:ext cx="0" cy="0"/>
+          <a:chOff x="0" y="0"/>
+          <a:chExt cx="0" cy="0"/>
+        </a:xfrm>
+      </p:grpSpPr>
+      <p:sp>
+        <p:nvSpPr>
+          <p:cNvPr id="2" name="Title 1"/>
+          <p:cNvSpPr>
+            <a:spLocks noGrp="1"/>
+          </p:cNvSpPr>
+          <p:nvPr>
+            <p:ph type="title"/>
+          </p:nvPr>
+        </p:nvSpPr>
+        <p:spPr/>
+        <p:txBody>
+          <a:bodyPr/>
+          <a:lstStyle/>
+          <a:p>
+            <a:r>
+              <a:rPr lang="en-US" dirty="0" smtClean="0"/>
+              <a:t>Maturity-at-Length</a:t>
+            </a:r>
+            <a:endParaRPr lang="en-US" dirty="0"/>
+          </a:p>
+        </p:txBody>
+      </p:sp>
+      <p:pic>
+        <p:nvPicPr>
+          <p:cNvPr id="4" name="Content Placeholder 3"/>
+          <p:cNvPicPr>
+            <a:picLocks noGrp="1" noChangeAspect="1"/>
+          </p:cNvPicPr>
+          <p:nvPr>
+            <p:ph idx="1"/>
+          </p:nvPr>
+        </p:nvPicPr>
+        <p:blipFill>
+          <a:blip r:embed="rId2" cstate="print">
+            <a:extLst>
+              <a:ext uri="{28A0092B-C50C-407E-A947-70E740481C1C}">
+                <a14:useLocalDpi xmlns:a14="http://schemas.microsoft.com/office/drawing/2010/main" val="0"/>
+              </a:ext>
+            </a:extLst>
+          </a:blip>
+          <a:stretch>
+            <a:fillRect/>
+          </a:stretch>
+        </p:blipFill>
+        <p:spPr>
+          <a:xfrm>
+            <a:off x="561839" y="1510748"/>
+            <a:ext cx="6832874" cy="5256057"/>
+          </a:xfrm>
+        </p:spPr>
+      </p:pic>
+      <p:sp>
+        <p:nvSpPr>
+          <p:cNvPr id="5" name="TextBox 4"/>
+          <p:cNvSpPr txBox="1"/>
+          <p:nvPr/>
+        </p:nvSpPr>
+        <p:spPr>
+          <a:xfrm>
+            <a:off x="8043312" y="2448623"/>
+            <a:ext cx="2141420" cy="1615827"/>
+          </a:xfrm>
+          <a:prstGeom prst="rect">
+            <a:avLst/>
+          </a:prstGeom>
+          <a:noFill/>
+        </p:spPr>
+        <p:txBody>
+          <a:bodyPr wrap="none" rtlCol="0">
+            <a:spAutoFit/>
+          </a:bodyPr>
+          <a:lstStyle/>
+          <a:p>
+            <a:r>
+              <a:rPr lang="en-US" u="sng" dirty="0" smtClean="0"/>
+              <a:t>Maturity Parameters</a:t>
+            </a:r>
+          </a:p>
+          <a:p>
+            <a:pPr>
+              <a:lnSpc>
+                <a:spcPct val="150000"/>
+              </a:lnSpc>
+            </a:pPr>
+            <a:r>
+              <a:rPr lang="en-US" dirty="0" smtClean="0"/>
+              <a:t>L50 = 40.7</a:t>
+            </a:r>
+          </a:p>
+          <a:p>
+            <a:pPr>
+              <a:lnSpc>
+                <a:spcPct val="150000"/>
+              </a:lnSpc>
+            </a:pPr>
+            <a:r>
+              <a:rPr lang="en-US" dirty="0" smtClean="0"/>
+              <a:t>Maturity slope = -3.7</a:t>
+            </a:r>
+          </a:p>
+          <a:p>
+            <a:pPr>
+              <a:lnSpc>
+                <a:spcPct val="150000"/>
+              </a:lnSpc>
+            </a:pPr>
+            <a:r>
+              <a:rPr lang="en-US" dirty="0" smtClean="0"/>
+              <a:t>First Mature Age = 2</a:t>
+            </a:r>
+            <a:endParaRPr lang="en-US" dirty="0"/>
+          </a:p>
+        </p:txBody>
+      </p:sp>
+    </p:spTree>
+    <p:extLst>
+      <p:ext uri="{BB962C8B-B14F-4D97-AF65-F5344CB8AC3E}">
+        <p14:creationId xmlns:p14="http://schemas.microsoft.com/office/powerpoint/2010/main" val="1157127974"/>
+      </p:ext>
+    </p:extLst>
+  </p:cSld>
+  <p:clrMapOvr>
+    <a:masterClrMapping/>
+  </p:clrMapOvr>
+</p:sld>
+</file>
+
+<file path=ppt/slides/slide11.xml><?xml version="1.0" encoding="utf-8"?>
+<p:sld xmlns:a="http://schemas.openxmlformats.org/drawingml/2006/main" xmlns:r="http://schemas.openxmlformats.org/officeDocument/2006/relationships" xmlns:p="http://schemas.openxmlformats.org/presentationml/2006/main">
+  <p:cSld>
+    <p:spTree>
+      <p:nvGrpSpPr>
+        <p:cNvPr id="1" name=""/>
+        <p:cNvGrpSpPr/>
+        <p:nvPr/>
+      </p:nvGrpSpPr>
+      <p:grpSpPr>
+        <a:xfrm>
+          <a:off x="0" y="0"/>
+          <a:ext cx="0" cy="0"/>
+          <a:chOff x="0" y="0"/>
+          <a:chExt cx="0" cy="0"/>
+        </a:xfrm>
+      </p:grpSpPr>
+      <p:sp>
+        <p:nvSpPr>
+          <p:cNvPr id="2" name="Title 1"/>
+          <p:cNvSpPr>
+            <a:spLocks noGrp="1"/>
+          </p:cNvSpPr>
+          <p:nvPr>
+            <p:ph type="title"/>
+          </p:nvPr>
+        </p:nvSpPr>
+        <p:spPr/>
+        <p:txBody>
+          <a:bodyPr/>
+          <a:lstStyle/>
+          <a:p>
+            <a:r>
+              <a:rPr lang="en-US" dirty="0" smtClean="0"/>
+              <a:t>Selectivity</a:t>
+            </a:r>
+            <a:endParaRPr lang="en-US" dirty="0"/>
+          </a:p>
+        </p:txBody>
+      </p:sp>
+      <p:pic>
+        <p:nvPicPr>
+          <p:cNvPr id="4" name="Content Placeholder 3"/>
+          <p:cNvPicPr>
+            <a:picLocks noGrp="1" noChangeAspect="1"/>
+          </p:cNvPicPr>
+          <p:nvPr>
+            <p:ph idx="1"/>
+          </p:nvPr>
+        </p:nvPicPr>
+        <p:blipFill>
+          <a:blip r:embed="rId2" cstate="print">
+            <a:extLst>
+              <a:ext uri="{28A0092B-C50C-407E-A947-70E740481C1C}">
+                <a14:useLocalDpi xmlns:a14="http://schemas.microsoft.com/office/drawing/2010/main" val="0"/>
+              </a:ext>
+            </a:extLst>
+          </a:blip>
+          <a:stretch>
+            <a:fillRect/>
+          </a:stretch>
+        </p:blipFill>
+        <p:spPr>
+          <a:xfrm>
+            <a:off x="501333" y="1447137"/>
+            <a:ext cx="7034121" cy="5410863"/>
+          </a:xfrm>
+        </p:spPr>
+      </p:pic>
+      <p:sp>
+        <p:nvSpPr>
+          <p:cNvPr id="5" name="TextBox 4"/>
+          <p:cNvSpPr txBox="1"/>
+          <p:nvPr/>
+        </p:nvSpPr>
+        <p:spPr>
+          <a:xfrm>
+            <a:off x="8014915" y="2059388"/>
+            <a:ext cx="3338885" cy="1200329"/>
+          </a:xfrm>
+          <a:prstGeom prst="rect">
+            <a:avLst/>
+          </a:prstGeom>
+          <a:noFill/>
+        </p:spPr>
+        <p:txBody>
+          <a:bodyPr wrap="square" rtlCol="0">
+            <a:spAutoFit/>
+          </a:bodyPr>
+          <a:lstStyle/>
+          <a:p>
+            <a:r>
+              <a:rPr lang="en-US" u="sng" dirty="0" smtClean="0"/>
+              <a:t>Selectivity Parameters</a:t>
+            </a:r>
+          </a:p>
+          <a:p>
+            <a:pPr>
+              <a:lnSpc>
+                <a:spcPct val="150000"/>
+              </a:lnSpc>
+            </a:pPr>
+            <a:r>
+              <a:rPr lang="en-US" dirty="0" smtClean="0"/>
+              <a:t>Size inflection = 32.9585</a:t>
+            </a:r>
+          </a:p>
+          <a:p>
+            <a:pPr>
+              <a:lnSpc>
+                <a:spcPct val="150000"/>
+              </a:lnSpc>
+            </a:pPr>
+            <a:r>
+              <a:rPr lang="en-US" dirty="0" smtClean="0"/>
+              <a:t>Size 95% width = 7.06601</a:t>
+            </a:r>
+            <a:endParaRPr lang="en-US" dirty="0"/>
+          </a:p>
+        </p:txBody>
+      </p:sp>
+    </p:spTree>
+    <p:extLst>
+      <p:ext uri="{BB962C8B-B14F-4D97-AF65-F5344CB8AC3E}">
+        <p14:creationId xmlns:p14="http://schemas.microsoft.com/office/powerpoint/2010/main" val="4176543545"/>
       </p:ext>
     </p:extLst>
   </p:cSld>
@@ -3089,7 +3367,7 @@
         </p:blipFill>
         <p:spPr>
           <a:xfrm>
-            <a:off x="3439886" y="330291"/>
+            <a:off x="3457303" y="330291"/>
             <a:ext cx="8612723" cy="6625172"/>
           </a:xfrm>
         </p:spPr>
@@ -3102,8 +3380,8 @@
         </p:nvSpPr>
         <p:spPr>
           <a:xfrm>
-            <a:off x="522514" y="1793966"/>
-            <a:ext cx="2778035" cy="2862322"/>
+            <a:off x="522514" y="1356644"/>
+            <a:ext cx="2778035" cy="4862870"/>
           </a:xfrm>
           <a:prstGeom prst="rect">
             <a:avLst/>
@@ -3116,27 +3394,72 @@
           </a:bodyPr>
           <a:lstStyle/>
           <a:p>
+            <a:pPr marL="285750" indent="-285750">
+              <a:spcAft>
+                <a:spcPts val="1200"/>
+              </a:spcAft>
+              <a:buFont typeface="Arial" panose="020B0604020202020204" pitchFamily="34" charset="0"/>
+              <a:buChar char="•"/>
+            </a:pPr>
             <a:r>
               <a:rPr lang="en-US" dirty="0" smtClean="0"/>
               <a:t>Commercial catch – 1949 – 2018 (used 2018 catch for 2019)</a:t>
             </a:r>
           </a:p>
           <a:p>
+            <a:pPr marL="285750" indent="-285750">
+              <a:spcAft>
+                <a:spcPts val="1200"/>
+              </a:spcAft>
+              <a:buFont typeface="Arial" panose="020B0604020202020204" pitchFamily="34" charset="0"/>
+              <a:buChar char="•"/>
+            </a:pPr>
             <a:r>
               <a:rPr lang="en-US" dirty="0" smtClean="0"/>
               <a:t>Commercial catch weight composition – 1950 - 2018</a:t>
             </a:r>
           </a:p>
           <a:p>
+            <a:pPr marL="285750" indent="-285750">
+              <a:spcAft>
+                <a:spcPts val="1200"/>
+              </a:spcAft>
+              <a:buFont typeface="Arial" panose="020B0604020202020204" pitchFamily="34" charset="0"/>
+              <a:buChar char="•"/>
+            </a:pPr>
             <a:r>
               <a:rPr lang="en-US" dirty="0" smtClean="0"/>
               <a:t>CPUE from commercial fishery (2 time series) – 1949 – 2003, 2003 – 2018 </a:t>
             </a:r>
           </a:p>
           <a:p>
+            <a:pPr marL="285750" indent="-285750">
+              <a:spcAft>
+                <a:spcPts val="1200"/>
+              </a:spcAft>
+              <a:buFont typeface="Arial" panose="020B0604020202020204" pitchFamily="34" charset="0"/>
+              <a:buChar char="•"/>
+            </a:pPr>
             <a:r>
               <a:rPr lang="en-US" dirty="0" smtClean="0"/>
-              <a:t>BFISH Survey Index (2016 – 2019)</a:t>
+              <a:t>BFISH Survey Index (2016 – 2019</a:t>
+            </a:r>
+            <a:r>
+              <a:rPr lang="en-US" dirty="0" smtClean="0"/>
+              <a:t>)</a:t>
+            </a:r>
+          </a:p>
+          <a:p>
+            <a:pPr marL="285750" indent="-285750">
+              <a:spcAft>
+                <a:spcPts val="1200"/>
+              </a:spcAft>
+              <a:buFont typeface="Arial" panose="020B0604020202020204" pitchFamily="34" charset="0"/>
+              <a:buChar char="•"/>
+            </a:pPr>
+            <a:r>
+              <a:rPr lang="en-US" dirty="0" smtClean="0"/>
+              <a:t>Commercial catch weight composition data (1950 – 2018) </a:t>
             </a:r>
             <a:endParaRPr lang="en-US" dirty="0"/>
           </a:p>
@@ -3449,7 +3772,7 @@
       </p:sp>
       <p:pic>
         <p:nvPicPr>
-          <p:cNvPr id="4" name="Content Placeholder 3"/>
+          <p:cNvPr id="7" name="Content Placeholder 6"/>
           <p:cNvPicPr>
             <a:picLocks noGrp="1" noChangeAspect="1"/>
           </p:cNvPicPr>
@@ -3458,7 +3781,7 @@
           </p:nvPr>
         </p:nvPicPr>
         <p:blipFill>
-          <a:blip r:embed="rId2">
+          <a:blip r:embed="rId2" cstate="print">
             <a:extLst>
               <a:ext uri="{28A0092B-C50C-407E-A947-70E740481C1C}">
                 <a14:useLocalDpi xmlns:a14="http://schemas.microsoft.com/office/drawing/2010/main" val="0"/>
@@ -3471,8 +3794,8 @@
         </p:blipFill>
         <p:spPr>
           <a:xfrm>
-            <a:off x="5337651" y="273617"/>
-            <a:ext cx="6375378" cy="6375378"/>
+            <a:off x="666592" y="1690688"/>
+            <a:ext cx="6096000" cy="4572000"/>
           </a:xfrm>
         </p:spPr>
       </p:pic>
@@ -3523,32 +3846,506 @@
           <a:p>
             <a:r>
               <a:rPr lang="en-US" dirty="0" smtClean="0"/>
-              <a:t>Growth Curve (</a:t>
-            </a:r>
-            <a:r>
-              <a:rPr lang="en-US" smtClean="0"/>
-              <a:t>Life History)</a:t>
-            </a:r>
-            <a:endParaRPr lang="en-US"/>
-          </a:p>
-        </p:txBody>
-      </p:sp>
-      <p:sp>
-        <p:nvSpPr>
-          <p:cNvPr id="3" name="Content Placeholder 2"/>
-          <p:cNvSpPr>
-            <a:spLocks noGrp="1"/>
-          </p:cNvSpPr>
+              <a:t>Commercial Catch Weight Composition </a:t>
+            </a:r>
+            <a:endParaRPr lang="en-US" dirty="0"/>
+          </a:p>
+        </p:txBody>
+      </p:sp>
+      <p:pic>
+        <p:nvPicPr>
+          <p:cNvPr id="4" name="Content Placeholder 3"/>
+          <p:cNvPicPr>
+            <a:picLocks noGrp="1" noChangeAspect="1"/>
+          </p:cNvPicPr>
           <p:nvPr>
             <p:ph idx="1"/>
           </p:nvPr>
-        </p:nvSpPr>
-        <p:spPr/>
-        <p:txBody>
-          <a:bodyPr/>
-          <a:lstStyle/>
-          <a:p>
-            <a:endParaRPr lang="en-US"/>
+        </p:nvPicPr>
+        <p:blipFill>
+          <a:blip r:embed="rId2" cstate="print">
+            <a:extLst>
+              <a:ext uri="{28A0092B-C50C-407E-A947-70E740481C1C}">
+                <a14:useLocalDpi xmlns:a14="http://schemas.microsoft.com/office/drawing/2010/main" val="0"/>
+              </a:ext>
+            </a:extLst>
+          </a:blip>
+          <a:stretch>
+            <a:fillRect/>
+          </a:stretch>
+        </p:blipFill>
+        <p:spPr>
+          <a:xfrm>
+            <a:off x="202213" y="1677587"/>
+            <a:ext cx="5656739" cy="4351338"/>
+          </a:xfrm>
+        </p:spPr>
+      </p:pic>
+      <p:pic>
+        <p:nvPicPr>
+          <p:cNvPr id="5" name="Picture 4"/>
+          <p:cNvPicPr>
+            <a:picLocks noChangeAspect="1"/>
+          </p:cNvPicPr>
+          <p:nvPr/>
+        </p:nvPicPr>
+        <p:blipFill>
+          <a:blip r:embed="rId3" cstate="print">
+            <a:extLst>
+              <a:ext uri="{28A0092B-C50C-407E-A947-70E740481C1C}">
+                <a14:useLocalDpi xmlns:a14="http://schemas.microsoft.com/office/drawing/2010/main" val="0"/>
+              </a:ext>
+            </a:extLst>
+          </a:blip>
+          <a:stretch>
+            <a:fillRect/>
+          </a:stretch>
+        </p:blipFill>
+        <p:spPr>
+          <a:xfrm>
+            <a:off x="5858953" y="1677587"/>
+            <a:ext cx="5697322" cy="4382555"/>
+          </a:xfrm>
+          <a:prstGeom prst="rect">
+            <a:avLst/>
+          </a:prstGeom>
+        </p:spPr>
+      </p:pic>
+    </p:spTree>
+    <p:extLst>
+      <p:ext uri="{BB962C8B-B14F-4D97-AF65-F5344CB8AC3E}">
+        <p14:creationId xmlns:p14="http://schemas.microsoft.com/office/powerpoint/2010/main" val="1966554193"/>
+      </p:ext>
+    </p:extLst>
+  </p:cSld>
+  <p:clrMapOvr>
+    <a:masterClrMapping/>
+  </p:clrMapOvr>
+</p:sld>
+</file>
+
+<file path=ppt/slides/slide7.xml><?xml version="1.0" encoding="utf-8"?>
+<p:sld xmlns:a="http://schemas.openxmlformats.org/drawingml/2006/main" xmlns:r="http://schemas.openxmlformats.org/officeDocument/2006/relationships" xmlns:p="http://schemas.openxmlformats.org/presentationml/2006/main">
+  <p:cSld>
+    <p:spTree>
+      <p:nvGrpSpPr>
+        <p:cNvPr id="1" name=""/>
+        <p:cNvGrpSpPr/>
+        <p:nvPr/>
+      </p:nvGrpSpPr>
+      <p:grpSpPr>
+        <a:xfrm>
+          <a:off x="0" y="0"/>
+          <a:ext cx="0" cy="0"/>
+          <a:chOff x="0" y="0"/>
+          <a:chExt cx="0" cy="0"/>
+        </a:xfrm>
+      </p:grpSpPr>
+      <p:sp>
+        <p:nvSpPr>
+          <p:cNvPr id="2" name="Title 1"/>
+          <p:cNvSpPr>
+            <a:spLocks noGrp="1"/>
+          </p:cNvSpPr>
+          <p:nvPr>
+            <p:ph type="title"/>
+          </p:nvPr>
+        </p:nvSpPr>
+        <p:spPr/>
+        <p:txBody>
+          <a:bodyPr/>
+          <a:lstStyle/>
+          <a:p>
+            <a:r>
+              <a:rPr lang="en-US" dirty="0" smtClean="0"/>
+              <a:t>Commercial Catch Weight Composition</a:t>
+            </a:r>
+            <a:endParaRPr lang="en-US" dirty="0"/>
+          </a:p>
+        </p:txBody>
+      </p:sp>
+      <p:pic>
+        <p:nvPicPr>
+          <p:cNvPr id="4" name="Content Placeholder 3"/>
+          <p:cNvPicPr>
+            <a:picLocks noGrp="1" noChangeAspect="1"/>
+          </p:cNvPicPr>
+          <p:nvPr>
+            <p:ph idx="1"/>
+          </p:nvPr>
+        </p:nvPicPr>
+        <p:blipFill>
+          <a:blip r:embed="rId2" cstate="print">
+            <a:extLst>
+              <a:ext uri="{28A0092B-C50C-407E-A947-70E740481C1C}">
+                <a14:useLocalDpi xmlns:a14="http://schemas.microsoft.com/office/drawing/2010/main" val="0"/>
+              </a:ext>
+            </a:extLst>
+          </a:blip>
+          <a:stretch>
+            <a:fillRect/>
+          </a:stretch>
+        </p:blipFill>
+        <p:spPr>
+          <a:xfrm>
+            <a:off x="60692" y="1888113"/>
+            <a:ext cx="4669246" cy="3591728"/>
+          </a:xfrm>
+        </p:spPr>
+      </p:pic>
+      <p:pic>
+        <p:nvPicPr>
+          <p:cNvPr id="5" name="Picture 4"/>
+          <p:cNvPicPr>
+            <a:picLocks noChangeAspect="1"/>
+          </p:cNvPicPr>
+          <p:nvPr/>
+        </p:nvPicPr>
+        <p:blipFill>
+          <a:blip r:embed="rId3" cstate="print">
+            <a:extLst>
+              <a:ext uri="{28A0092B-C50C-407E-A947-70E740481C1C}">
+                <a14:useLocalDpi xmlns:a14="http://schemas.microsoft.com/office/drawing/2010/main" val="0"/>
+              </a:ext>
+            </a:extLst>
+          </a:blip>
+          <a:stretch>
+            <a:fillRect/>
+          </a:stretch>
+        </p:blipFill>
+        <p:spPr>
+          <a:xfrm>
+            <a:off x="4687449" y="1871771"/>
+            <a:ext cx="4711735" cy="3624412"/>
+          </a:xfrm>
+          <a:prstGeom prst="rect">
+            <a:avLst/>
+          </a:prstGeom>
+        </p:spPr>
+      </p:pic>
+      <p:pic>
+        <p:nvPicPr>
+          <p:cNvPr id="6" name="Content Placeholder 3"/>
+          <p:cNvPicPr>
+            <a:picLocks noChangeAspect="1"/>
+          </p:cNvPicPr>
+          <p:nvPr/>
+        </p:nvPicPr>
+        <p:blipFill rotWithShape="1">
+          <a:blip r:embed="rId4" cstate="print">
+            <a:extLst>
+              <a:ext uri="{28A0092B-C50C-407E-A947-70E740481C1C}">
+                <a14:useLocalDpi xmlns:a14="http://schemas.microsoft.com/office/drawing/2010/main" val="0"/>
+              </a:ext>
+            </a:extLst>
+          </a:blip>
+          <a:srcRect r="37684"/>
+          <a:stretch/>
+        </p:blipFill>
+        <p:spPr>
+          <a:xfrm>
+            <a:off x="9356695" y="1888113"/>
+            <a:ext cx="2909689" cy="3591728"/>
+          </a:xfrm>
+          <a:prstGeom prst="rect">
+            <a:avLst/>
+          </a:prstGeom>
+        </p:spPr>
+      </p:pic>
+    </p:spTree>
+    <p:extLst>
+      <p:ext uri="{BB962C8B-B14F-4D97-AF65-F5344CB8AC3E}">
+        <p14:creationId xmlns:p14="http://schemas.microsoft.com/office/powerpoint/2010/main" val="712036697"/>
+      </p:ext>
+    </p:extLst>
+  </p:cSld>
+  <p:clrMapOvr>
+    <a:masterClrMapping/>
+  </p:clrMapOvr>
+  <p:timing>
+    <p:tnLst>
+      <p:par>
+        <p:cTn id="1" dur="indefinite" restart="never" nodeType="tmRoot"/>
+      </p:par>
+    </p:tnLst>
+  </p:timing>
+</p:sld>
+</file>
+
+<file path=ppt/slides/slide8.xml><?xml version="1.0" encoding="utf-8"?>
+<p:sld xmlns:a="http://schemas.openxmlformats.org/drawingml/2006/main" xmlns:r="http://schemas.openxmlformats.org/officeDocument/2006/relationships" xmlns:p="http://schemas.openxmlformats.org/presentationml/2006/main">
+  <p:cSld>
+    <p:spTree>
+      <p:nvGrpSpPr>
+        <p:cNvPr id="1" name=""/>
+        <p:cNvGrpSpPr/>
+        <p:nvPr/>
+      </p:nvGrpSpPr>
+      <p:grpSpPr>
+        <a:xfrm>
+          <a:off x="0" y="0"/>
+          <a:ext cx="0" cy="0"/>
+          <a:chOff x="0" y="0"/>
+          <a:chExt cx="0" cy="0"/>
+        </a:xfrm>
+      </p:grpSpPr>
+      <p:sp>
+        <p:nvSpPr>
+          <p:cNvPr id="2" name="Title 1"/>
+          <p:cNvSpPr>
+            <a:spLocks noGrp="1"/>
+          </p:cNvSpPr>
+          <p:nvPr>
+            <p:ph type="title"/>
+          </p:nvPr>
+        </p:nvSpPr>
+        <p:spPr/>
+        <p:txBody>
+          <a:bodyPr/>
+          <a:lstStyle/>
+          <a:p>
+            <a:r>
+              <a:rPr lang="en-US" dirty="0" smtClean="0"/>
+              <a:t>Commercial Catch Weight Compositions</a:t>
+            </a:r>
+            <a:endParaRPr lang="en-US" dirty="0"/>
+          </a:p>
+        </p:txBody>
+      </p:sp>
+      <p:pic>
+        <p:nvPicPr>
+          <p:cNvPr id="4" name="Picture 3"/>
+          <p:cNvPicPr>
+            <a:picLocks noChangeAspect="1"/>
+          </p:cNvPicPr>
+          <p:nvPr/>
+        </p:nvPicPr>
+        <p:blipFill>
+          <a:blip r:embed="rId2" cstate="print">
+            <a:extLst>
+              <a:ext uri="{28A0092B-C50C-407E-A947-70E740481C1C}">
+                <a14:useLocalDpi xmlns:a14="http://schemas.microsoft.com/office/drawing/2010/main" val="0"/>
+              </a:ext>
+            </a:extLst>
+          </a:blip>
+          <a:stretch>
+            <a:fillRect/>
+          </a:stretch>
+        </p:blipFill>
+        <p:spPr>
+          <a:xfrm>
+            <a:off x="6110743" y="2053294"/>
+            <a:ext cx="5729796" cy="4407535"/>
+          </a:xfrm>
+          <a:prstGeom prst="rect">
+            <a:avLst/>
+          </a:prstGeom>
+        </p:spPr>
+      </p:pic>
+      <p:pic>
+        <p:nvPicPr>
+          <p:cNvPr id="5" name="Picture 4"/>
+          <p:cNvPicPr>
+            <a:picLocks noChangeAspect="1"/>
+          </p:cNvPicPr>
+          <p:nvPr/>
+        </p:nvPicPr>
+        <p:blipFill>
+          <a:blip r:embed="rId3" cstate="print">
+            <a:extLst>
+              <a:ext uri="{28A0092B-C50C-407E-A947-70E740481C1C}">
+                <a14:useLocalDpi xmlns:a14="http://schemas.microsoft.com/office/drawing/2010/main" val="0"/>
+              </a:ext>
+            </a:extLst>
+          </a:blip>
+          <a:stretch>
+            <a:fillRect/>
+          </a:stretch>
+        </p:blipFill>
+        <p:spPr>
+          <a:xfrm>
+            <a:off x="572233" y="2053294"/>
+            <a:ext cx="5398588" cy="4152760"/>
+          </a:xfrm>
+          <a:prstGeom prst="rect">
+            <a:avLst/>
+          </a:prstGeom>
+        </p:spPr>
+      </p:pic>
+    </p:spTree>
+    <p:extLst>
+      <p:ext uri="{BB962C8B-B14F-4D97-AF65-F5344CB8AC3E}">
+        <p14:creationId xmlns:p14="http://schemas.microsoft.com/office/powerpoint/2010/main" val="77993937"/>
+      </p:ext>
+    </p:extLst>
+  </p:cSld>
+  <p:clrMapOvr>
+    <a:masterClrMapping/>
+  </p:clrMapOvr>
+</p:sld>
+</file>
+
+<file path=ppt/slides/slide9.xml><?xml version="1.0" encoding="utf-8"?>
+<p:sld xmlns:a="http://schemas.openxmlformats.org/drawingml/2006/main" xmlns:r="http://schemas.openxmlformats.org/officeDocument/2006/relationships" xmlns:p="http://schemas.openxmlformats.org/presentationml/2006/main">
+  <p:cSld>
+    <p:spTree>
+      <p:nvGrpSpPr>
+        <p:cNvPr id="1" name=""/>
+        <p:cNvGrpSpPr/>
+        <p:nvPr/>
+      </p:nvGrpSpPr>
+      <p:grpSpPr>
+        <a:xfrm>
+          <a:off x="0" y="0"/>
+          <a:ext cx="0" cy="0"/>
+          <a:chOff x="0" y="0"/>
+          <a:chExt cx="0" cy="0"/>
+        </a:xfrm>
+      </p:grpSpPr>
+      <p:sp>
+        <p:nvSpPr>
+          <p:cNvPr id="2" name="Title 1"/>
+          <p:cNvSpPr>
+            <a:spLocks noGrp="1"/>
+          </p:cNvSpPr>
+          <p:nvPr>
+            <p:ph type="title"/>
+          </p:nvPr>
+        </p:nvSpPr>
+        <p:spPr/>
+        <p:txBody>
+          <a:bodyPr/>
+          <a:lstStyle/>
+          <a:p>
+            <a:r>
+              <a:rPr lang="en-US" dirty="0" smtClean="0"/>
+              <a:t>Age-at-Length</a:t>
+            </a:r>
+            <a:endParaRPr lang="en-US" dirty="0"/>
+          </a:p>
+        </p:txBody>
+      </p:sp>
+      <p:pic>
+        <p:nvPicPr>
+          <p:cNvPr id="4" name="Content Placeholder 3"/>
+          <p:cNvPicPr>
+            <a:picLocks noGrp="1" noChangeAspect="1"/>
+          </p:cNvPicPr>
+          <p:nvPr>
+            <p:ph idx="1"/>
+          </p:nvPr>
+        </p:nvPicPr>
+        <p:blipFill>
+          <a:blip r:embed="rId2" cstate="print">
+            <a:extLst>
+              <a:ext uri="{28A0092B-C50C-407E-A947-70E740481C1C}">
+                <a14:useLocalDpi xmlns:a14="http://schemas.microsoft.com/office/drawing/2010/main" val="0"/>
+              </a:ext>
+            </a:extLst>
+          </a:blip>
+          <a:stretch>
+            <a:fillRect/>
+          </a:stretch>
+        </p:blipFill>
+        <p:spPr>
+          <a:xfrm>
+            <a:off x="838200" y="1690688"/>
+            <a:ext cx="5656739" cy="4351338"/>
+          </a:xfrm>
+        </p:spPr>
+      </p:pic>
+      <p:sp>
+        <p:nvSpPr>
+          <p:cNvPr id="5" name="TextBox 4"/>
+          <p:cNvSpPr txBox="1"/>
+          <p:nvPr/>
+        </p:nvSpPr>
+        <p:spPr>
+          <a:xfrm>
+            <a:off x="7001691" y="2464526"/>
+            <a:ext cx="4154727" cy="2723823"/>
+          </a:xfrm>
+          <a:prstGeom prst="rect">
+            <a:avLst/>
+          </a:prstGeom>
+          <a:noFill/>
+        </p:spPr>
+        <p:txBody>
+          <a:bodyPr wrap="none" rtlCol="0">
+            <a:spAutoFit/>
+          </a:bodyPr>
+          <a:lstStyle/>
+          <a:p>
+            <a:r>
+              <a:rPr lang="en-US" u="sng" dirty="0" smtClean="0"/>
+              <a:t>von </a:t>
+            </a:r>
+            <a:r>
+              <a:rPr lang="en-US" u="sng" dirty="0" err="1" smtClean="0"/>
+              <a:t>Bertalanffy</a:t>
+            </a:r>
+            <a:r>
+              <a:rPr lang="en-US" u="sng" dirty="0" smtClean="0"/>
+              <a:t> with L1 and L2 Parameters</a:t>
+            </a:r>
+          </a:p>
+          <a:p>
+            <a:pPr>
+              <a:lnSpc>
+                <a:spcPct val="150000"/>
+              </a:lnSpc>
+            </a:pPr>
+            <a:r>
+              <a:rPr lang="en-US" dirty="0" smtClean="0"/>
+              <a:t>k = 0.242</a:t>
+            </a:r>
+          </a:p>
+          <a:p>
+            <a:pPr>
+              <a:lnSpc>
+                <a:spcPct val="150000"/>
+              </a:lnSpc>
+            </a:pPr>
+            <a:r>
+              <a:rPr lang="en-US" dirty="0" smtClean="0"/>
+              <a:t>L1 = 11.7</a:t>
+            </a:r>
+          </a:p>
+          <a:p>
+            <a:pPr>
+              <a:lnSpc>
+                <a:spcPct val="150000"/>
+              </a:lnSpc>
+            </a:pPr>
+            <a:r>
+              <a:rPr lang="en-US" dirty="0" smtClean="0"/>
+              <a:t>L2 = 67.4</a:t>
+            </a:r>
+          </a:p>
+          <a:p>
+            <a:pPr>
+              <a:lnSpc>
+                <a:spcPct val="150000"/>
+              </a:lnSpc>
+            </a:pPr>
+            <a:r>
+              <a:rPr lang="en-US" dirty="0" smtClean="0"/>
+              <a:t>CV young = 0.115</a:t>
+            </a:r>
+          </a:p>
+          <a:p>
+            <a:pPr>
+              <a:lnSpc>
+                <a:spcPct val="150000"/>
+              </a:lnSpc>
+            </a:pPr>
+            <a:r>
+              <a:rPr lang="en-US" dirty="0" smtClean="0"/>
+              <a:t>CV old = 0.067</a:t>
+            </a:r>
+          </a:p>
+          <a:p>
+            <a:endParaRPr lang="en-US" dirty="0"/>
           </a:p>
         </p:txBody>
       </p:sp>
@@ -3562,6 +4359,13 @@
   <p:clrMapOvr>
     <a:masterClrMapping/>
   </p:clrMapOvr>
+  <p:timing>
+    <p:tnLst>
+      <p:par>
+        <p:cTn id="1" dur="indefinite" restart="never" nodeType="tmRoot"/>
+      </p:par>
+    </p:tnLst>
+  </p:timing>
 </p:sld>
 </file>
 

</xml_diff>